<commit_message>
add dijkstra to ppt
</commit_message>
<xml_diff>
--- a/Presentasi Final Project.pptx
+++ b/Presentasi Final Project.pptx
@@ -5,10 +5,10 @@
     <p:sldMasterId id="2147483648" r:id="rId1"/>
   </p:sldMasterIdLst>
   <p:notesMasterIdLst>
-    <p:notesMasterId r:id="rId19"/>
+    <p:notesMasterId r:id="rId26"/>
   </p:notesMasterIdLst>
   <p:handoutMasterIdLst>
-    <p:handoutMasterId r:id="rId20"/>
+    <p:handoutMasterId r:id="rId27"/>
   </p:handoutMasterIdLst>
   <p:sldIdLst>
     <p:sldId id="257" r:id="rId3"/>
@@ -26,7 +26,14 @@
     <p:sldId id="323" r:id="rId15"/>
     <p:sldId id="325" r:id="rId16"/>
     <p:sldId id="328" r:id="rId17"/>
-    <p:sldId id="282" r:id="rId18"/>
+    <p:sldId id="330" r:id="rId18"/>
+    <p:sldId id="331" r:id="rId19"/>
+    <p:sldId id="332" r:id="rId20"/>
+    <p:sldId id="339" r:id="rId21"/>
+    <p:sldId id="340" r:id="rId22"/>
+    <p:sldId id="342" r:id="rId23"/>
+    <p:sldId id="345" r:id="rId24"/>
+    <p:sldId id="282" r:id="rId25"/>
   </p:sldIdLst>
   <p:sldSz cx="9144000" cy="5143500"/>
   <p:notesSz cx="6858000" cy="9144000"/>
@@ -5336,6 +5343,1210 @@
         <p:nvPr/>
       </p:nvGrpSpPr>
       <p:grpSpPr/>
+      <p:sp>
+        <p:nvSpPr>
+          <p:cNvPr id="2" name="Title 1"/>
+          <p:cNvSpPr>
+            <a:spLocks noGrp="1"/>
+          </p:cNvSpPr>
+          <p:nvPr>
+            <p:ph type="title"/>
+          </p:nvPr>
+        </p:nvSpPr>
+        <p:spPr/>
+        <p:txBody>
+          <a:bodyPr/>
+          <a:p>
+            <a:r>
+              <a:rPr lang="en-GB" altLang="en-US"/>
+              <a:t>Penjelasan Dijkstra's Algorithm</a:t>
+            </a:r>
+            <a:endParaRPr lang="en-GB" altLang="en-US"/>
+          </a:p>
+        </p:txBody>
+      </p:sp>
+      <p:sp>
+        <p:nvSpPr>
+          <p:cNvPr id="20" name="文本框 19"/>
+          <p:cNvSpPr txBox="1"/>
+          <p:nvPr/>
+        </p:nvSpPr>
+        <p:spPr>
+          <a:xfrm>
+            <a:off x="628650" y="2032635"/>
+            <a:ext cx="8004175" cy="865505"/>
+          </a:xfrm>
+          <a:prstGeom prst="rect">
+            <a:avLst/>
+          </a:prstGeom>
+          <a:noFill/>
+        </p:spPr>
+        <p:txBody>
+          <a:bodyPr wrap="square" rtlCol="0">
+            <a:spAutoFit/>
+          </a:bodyPr>
+          <a:p>
+            <a:pPr marR="0" algn="ctr" defTabSz="685800" eaLnBrk="1" fontAlgn="auto" hangingPunct="1">
+              <a:lnSpc>
+                <a:spcPct val="120000"/>
+              </a:lnSpc>
+              <a:spcBef>
+                <a:spcPts val="0"/>
+              </a:spcBef>
+              <a:spcAft>
+                <a:spcPts val="0"/>
+              </a:spcAft>
+              <a:buClrTx/>
+              <a:buSzTx/>
+              <a:buFontTx/>
+              <a:defRPr/>
+            </a:pPr>
+            <a:r>
+              <a:rPr kumimoji="0" lang="en-GB" altLang="en-US" sz="2100" kern="1200" cap="none" spc="0" normalizeH="0" baseline="0" noProof="0" dirty="0">
+                <a:solidFill>
+                  <a:schemeClr val="bg1"/>
+                </a:solidFill>
+                <a:latin typeface="Arial" panose="020B0604020202020204" pitchFamily="34" charset="0"/>
+                <a:ea typeface="Arial" panose="020B0604020202020204" pitchFamily="34" charset="0"/>
+                <a:cs typeface="Arial" panose="020B0604020202020204" pitchFamily="34" charset="0"/>
+              </a:rPr>
+              <a:t>Dijkstra Algorithm digunakan untuk mengatasi permasalahan request yang harus dikirimkan dengan lebih dari 1 provider</a:t>
+            </a:r>
+            <a:endParaRPr kumimoji="0" lang="en-GB" altLang="en-US" sz="2100" kern="1200" cap="none" spc="0" normalizeH="0" baseline="0" noProof="0" dirty="0">
+              <a:solidFill>
+                <a:schemeClr val="bg1"/>
+              </a:solidFill>
+              <a:latin typeface="Arial" panose="020B0604020202020204" pitchFamily="34" charset="0"/>
+              <a:ea typeface="Arial" panose="020B0604020202020204" pitchFamily="34" charset="0"/>
+              <a:cs typeface="Arial" panose="020B0604020202020204" pitchFamily="34" charset="0"/>
+            </a:endParaRPr>
+          </a:p>
+        </p:txBody>
+      </p:sp>
+    </p:spTree>
+  </p:cSld>
+  <p:clrMapOvr>
+    <a:masterClrMapping/>
+  </p:clrMapOvr>
+</p:sld>
+</file>
+
+<file path=ppt/slides/slide17.xml><?xml version="1.0" encoding="utf-8"?>
+<p:sld xmlns:a="http://schemas.openxmlformats.org/drawingml/2006/main" xmlns:r="http://schemas.openxmlformats.org/officeDocument/2006/relationships" xmlns:p="http://schemas.openxmlformats.org/presentationml/2006/main">
+  <p:cSld>
+    <p:spTree>
+      <p:nvGrpSpPr>
+        <p:cNvPr id="1" name=""/>
+        <p:cNvGrpSpPr/>
+        <p:nvPr/>
+      </p:nvGrpSpPr>
+      <p:grpSpPr/>
+      <p:sp>
+        <p:nvSpPr>
+          <p:cNvPr id="2" name="Title 1"/>
+          <p:cNvSpPr>
+            <a:spLocks noGrp="1"/>
+          </p:cNvSpPr>
+          <p:nvPr>
+            <p:ph type="title"/>
+          </p:nvPr>
+        </p:nvSpPr>
+        <p:spPr/>
+        <p:txBody>
+          <a:bodyPr/>
+          <a:p>
+            <a:r>
+              <a:rPr lang="en-GB" altLang="en-US"/>
+              <a:t>Penjelasan Dijkstra's Algorithm</a:t>
+            </a:r>
+            <a:endParaRPr lang="en-GB" altLang="en-US"/>
+          </a:p>
+        </p:txBody>
+      </p:sp>
+      <p:pic>
+        <p:nvPicPr>
+          <p:cNvPr id="3" name="Content Placeholder 2"/>
+          <p:cNvPicPr>
+            <a:picLocks noChangeAspect="1"/>
+          </p:cNvPicPr>
+          <p:nvPr>
+            <p:ph idx="1"/>
+          </p:nvPr>
+        </p:nvPicPr>
+        <p:blipFill>
+          <a:blip r:embed="rId1"/>
+          <a:stretch>
+            <a:fillRect/>
+          </a:stretch>
+        </p:blipFill>
+        <p:spPr>
+          <a:xfrm>
+            <a:off x="1643380" y="1400175"/>
+            <a:ext cx="5856605" cy="1209675"/>
+          </a:xfrm>
+          <a:prstGeom prst="rect">
+            <a:avLst/>
+          </a:prstGeom>
+          <a:effectLst>
+            <a:outerShdw blurRad="685800" dist="38100" dir="2700000" algn="tl" rotWithShape="0">
+              <a:prstClr val="black">
+                <a:alpha val="40000"/>
+              </a:prstClr>
+            </a:outerShdw>
+          </a:effectLst>
+        </p:spPr>
+      </p:pic>
+      <p:sp>
+        <p:nvSpPr>
+          <p:cNvPr id="4" name="文本框 19"/>
+          <p:cNvSpPr txBox="1"/>
+          <p:nvPr/>
+        </p:nvSpPr>
+        <p:spPr>
+          <a:xfrm>
+            <a:off x="1414145" y="3176270"/>
+            <a:ext cx="6316345" cy="1087755"/>
+          </a:xfrm>
+          <a:prstGeom prst="rect">
+            <a:avLst/>
+          </a:prstGeom>
+          <a:noFill/>
+        </p:spPr>
+        <p:txBody>
+          <a:bodyPr wrap="square" rtlCol="0">
+            <a:spAutoFit/>
+          </a:bodyPr>
+          <a:p>
+            <a:pPr marR="0" algn="l" defTabSz="685800" eaLnBrk="1" fontAlgn="auto" hangingPunct="1">
+              <a:lnSpc>
+                <a:spcPct val="120000"/>
+              </a:lnSpc>
+              <a:spcBef>
+                <a:spcPts val="0"/>
+              </a:spcBef>
+              <a:spcAft>
+                <a:spcPts val="0"/>
+              </a:spcAft>
+              <a:buClrTx/>
+              <a:buSzTx/>
+              <a:buFontTx/>
+              <a:defRPr/>
+            </a:pPr>
+            <a:r>
+              <a:rPr kumimoji="0" lang="en-GB" altLang="en-US" sz="1800" kern="1200" cap="none" spc="0" normalizeH="0" baseline="0" noProof="0" dirty="0">
+                <a:solidFill>
+                  <a:schemeClr val="bg1"/>
+                </a:solidFill>
+                <a:latin typeface="Arial" panose="020B0604020202020204" pitchFamily="34" charset="0"/>
+                <a:ea typeface="Arial" panose="020B0604020202020204" pitchFamily="34" charset="0"/>
+                <a:cs typeface="Arial" panose="020B0604020202020204" pitchFamily="34" charset="0"/>
+              </a:rPr>
+              <a:t>Diubah menjadi Graf</a:t>
+            </a:r>
+            <a:endParaRPr kumimoji="0" lang="en-GB" altLang="en-US" sz="1800" kern="1200" cap="none" spc="0" normalizeH="0" baseline="0" noProof="0" dirty="0">
+              <a:solidFill>
+                <a:schemeClr val="bg1"/>
+              </a:solidFill>
+              <a:latin typeface="Arial" panose="020B0604020202020204" pitchFamily="34" charset="0"/>
+              <a:ea typeface="Arial" panose="020B0604020202020204" pitchFamily="34" charset="0"/>
+              <a:cs typeface="Arial" panose="020B0604020202020204" pitchFamily="34" charset="0"/>
+            </a:endParaRPr>
+          </a:p>
+          <a:p>
+            <a:pPr marR="0" algn="l" defTabSz="685800" eaLnBrk="1" fontAlgn="auto" hangingPunct="1">
+              <a:lnSpc>
+                <a:spcPct val="120000"/>
+              </a:lnSpc>
+              <a:spcBef>
+                <a:spcPts val="0"/>
+              </a:spcBef>
+              <a:spcAft>
+                <a:spcPts val="0"/>
+              </a:spcAft>
+              <a:buClrTx/>
+              <a:buSzTx/>
+              <a:buFontTx/>
+              <a:defRPr/>
+            </a:pPr>
+            <a:r>
+              <a:rPr kumimoji="0" lang="en-GB" altLang="en-US" sz="1800" kern="1200" cap="none" spc="0" normalizeH="0" baseline="0" noProof="0" dirty="0">
+                <a:solidFill>
+                  <a:schemeClr val="bg1"/>
+                </a:solidFill>
+                <a:latin typeface="Arial" panose="020B0604020202020204" pitchFamily="34" charset="0"/>
+                <a:ea typeface="Arial" panose="020B0604020202020204" pitchFamily="34" charset="0"/>
+                <a:cs typeface="Arial" panose="020B0604020202020204" pitchFamily="34" charset="0"/>
+              </a:rPr>
+              <a:t>- Vertex : nama provider dan kota yang dilayani</a:t>
+            </a:r>
+            <a:endParaRPr kumimoji="0" lang="en-GB" altLang="en-US" sz="1800" kern="1200" cap="none" spc="0" normalizeH="0" baseline="0" noProof="0" dirty="0">
+              <a:solidFill>
+                <a:schemeClr val="bg1"/>
+              </a:solidFill>
+              <a:latin typeface="Arial" panose="020B0604020202020204" pitchFamily="34" charset="0"/>
+              <a:ea typeface="Arial" panose="020B0604020202020204" pitchFamily="34" charset="0"/>
+              <a:cs typeface="Arial" panose="020B0604020202020204" pitchFamily="34" charset="0"/>
+            </a:endParaRPr>
+          </a:p>
+          <a:p>
+            <a:pPr marR="0" algn="l" defTabSz="685800" eaLnBrk="1" fontAlgn="auto" hangingPunct="1">
+              <a:lnSpc>
+                <a:spcPct val="120000"/>
+              </a:lnSpc>
+              <a:spcBef>
+                <a:spcPts val="0"/>
+              </a:spcBef>
+              <a:spcAft>
+                <a:spcPts val="0"/>
+              </a:spcAft>
+              <a:buClrTx/>
+              <a:buSzTx/>
+              <a:buFontTx/>
+              <a:defRPr/>
+            </a:pPr>
+            <a:r>
+              <a:rPr kumimoji="0" lang="en-GB" altLang="en-US" sz="1800" kern="1200" cap="none" spc="0" normalizeH="0" baseline="0" noProof="0" dirty="0">
+                <a:solidFill>
+                  <a:schemeClr val="bg1"/>
+                </a:solidFill>
+                <a:latin typeface="Arial" panose="020B0604020202020204" pitchFamily="34" charset="0"/>
+                <a:ea typeface="Arial" panose="020B0604020202020204" pitchFamily="34" charset="0"/>
+                <a:cs typeface="Arial" panose="020B0604020202020204" pitchFamily="34" charset="0"/>
+              </a:rPr>
+              <a:t>- Edge : hubungan provider dengan kota yang dilayaninya</a:t>
+            </a:r>
+            <a:endParaRPr kumimoji="0" lang="en-GB" altLang="en-US" sz="1800" kern="1200" cap="none" spc="0" normalizeH="0" baseline="0" noProof="0" dirty="0">
+              <a:solidFill>
+                <a:schemeClr val="bg1"/>
+              </a:solidFill>
+              <a:latin typeface="Arial" panose="020B0604020202020204" pitchFamily="34" charset="0"/>
+              <a:ea typeface="Arial" panose="020B0604020202020204" pitchFamily="34" charset="0"/>
+              <a:cs typeface="Arial" panose="020B0604020202020204" pitchFamily="34" charset="0"/>
+            </a:endParaRPr>
+          </a:p>
+        </p:txBody>
+      </p:sp>
+    </p:spTree>
+  </p:cSld>
+  <p:clrMapOvr>
+    <a:masterClrMapping/>
+  </p:clrMapOvr>
+</p:sld>
+</file>
+
+<file path=ppt/slides/slide18.xml><?xml version="1.0" encoding="utf-8"?>
+<p:sld xmlns:a="http://schemas.openxmlformats.org/drawingml/2006/main" xmlns:r="http://schemas.openxmlformats.org/officeDocument/2006/relationships" xmlns:p="http://schemas.openxmlformats.org/presentationml/2006/main">
+  <p:cSld>
+    <p:spTree>
+      <p:nvGrpSpPr>
+        <p:cNvPr id="1" name=""/>
+        <p:cNvGrpSpPr/>
+        <p:nvPr/>
+      </p:nvGrpSpPr>
+      <p:grpSpPr/>
+      <p:sp>
+        <p:nvSpPr>
+          <p:cNvPr id="2" name="Title 1"/>
+          <p:cNvSpPr>
+            <a:spLocks noGrp="1"/>
+          </p:cNvSpPr>
+          <p:nvPr>
+            <p:ph type="title"/>
+          </p:nvPr>
+        </p:nvSpPr>
+        <p:spPr/>
+        <p:txBody>
+          <a:bodyPr/>
+          <a:p>
+            <a:r>
+              <a:rPr lang="en-GB" altLang="en-US">
+                <a:sym typeface="+mn-ea"/>
+              </a:rPr>
+              <a:t>Penjelasan Dijkstra's Algorithm</a:t>
+            </a:r>
+            <a:endParaRPr lang="en-US"/>
+          </a:p>
+        </p:txBody>
+      </p:sp>
+      <p:pic>
+        <p:nvPicPr>
+          <p:cNvPr id="6" name="Content Placeholder 5" descr="C:\Users\aftermath\Documents\CS-101\SAINS MANAJEMEN\ASSET\DIAG1.pngDIAG1"/>
+          <p:cNvPicPr>
+            <a:picLocks noChangeAspect="1"/>
+          </p:cNvPicPr>
+          <p:nvPr>
+            <p:ph idx="1"/>
+          </p:nvPr>
+        </p:nvPicPr>
+        <p:blipFill>
+          <a:blip r:embed="rId1"/>
+          <a:srcRect l="3" r="3"/>
+          <a:stretch>
+            <a:fillRect/>
+          </a:stretch>
+        </p:blipFill>
+        <p:spPr>
+          <a:xfrm>
+            <a:off x="763270" y="1148715"/>
+            <a:ext cx="4161155" cy="3500120"/>
+          </a:xfrm>
+          <a:prstGeom prst="rect">
+            <a:avLst/>
+          </a:prstGeom>
+          <a:effectLst>
+            <a:outerShdw blurRad="114300" dist="38100" dir="2700000" algn="tl" rotWithShape="0">
+              <a:prstClr val="black">
+                <a:alpha val="40000"/>
+              </a:prstClr>
+            </a:outerShdw>
+          </a:effectLst>
+        </p:spPr>
+      </p:pic>
+      <p:pic>
+        <p:nvPicPr>
+          <p:cNvPr id="7" name="Picture 6"/>
+          <p:cNvPicPr>
+            <a:picLocks noChangeAspect="1"/>
+          </p:cNvPicPr>
+          <p:nvPr/>
+        </p:nvPicPr>
+        <p:blipFill>
+          <a:blip r:embed="rId2"/>
+          <a:stretch>
+            <a:fillRect/>
+          </a:stretch>
+        </p:blipFill>
+        <p:spPr>
+          <a:xfrm>
+            <a:off x="5453380" y="1703070"/>
+            <a:ext cx="2838450" cy="1581150"/>
+          </a:xfrm>
+          <a:prstGeom prst="rect">
+            <a:avLst/>
+          </a:prstGeom>
+          <a:effectLst>
+            <a:outerShdw blurRad="114300" dist="38100" dir="2700000" algn="tl" rotWithShape="0">
+              <a:prstClr val="black">
+                <a:alpha val="40000"/>
+              </a:prstClr>
+            </a:outerShdw>
+          </a:effectLst>
+        </p:spPr>
+      </p:pic>
+    </p:spTree>
+  </p:cSld>
+  <p:clrMapOvr>
+    <a:masterClrMapping/>
+  </p:clrMapOvr>
+</p:sld>
+</file>
+
+<file path=ppt/slides/slide19.xml><?xml version="1.0" encoding="utf-8"?>
+<p:sld xmlns:a="http://schemas.openxmlformats.org/drawingml/2006/main" xmlns:r="http://schemas.openxmlformats.org/officeDocument/2006/relationships" xmlns:p="http://schemas.openxmlformats.org/presentationml/2006/main">
+  <p:cSld>
+    <p:spTree>
+      <p:nvGrpSpPr>
+        <p:cNvPr id="1" name=""/>
+        <p:cNvGrpSpPr/>
+        <p:nvPr/>
+      </p:nvGrpSpPr>
+      <p:grpSpPr/>
+      <p:sp>
+        <p:nvSpPr>
+          <p:cNvPr id="2" name="Title 1"/>
+          <p:cNvSpPr>
+            <a:spLocks noGrp="1"/>
+          </p:cNvSpPr>
+          <p:nvPr>
+            <p:ph type="title"/>
+          </p:nvPr>
+        </p:nvSpPr>
+        <p:spPr/>
+        <p:txBody>
+          <a:bodyPr/>
+          <a:p>
+            <a:r>
+              <a:rPr lang="en-GB" altLang="en-US">
+                <a:sym typeface="+mn-ea"/>
+              </a:rPr>
+              <a:t>Penjelasan Dijkstra's Algorithm</a:t>
+            </a:r>
+            <a:endParaRPr lang="en-US"/>
+          </a:p>
+        </p:txBody>
+      </p:sp>
+      <p:pic>
+        <p:nvPicPr>
+          <p:cNvPr id="6" name="Content Placeholder 5" descr="C:\Users\aftermath\Documents\CS-101\SAINS MANAJEMEN\ASSET\DIAG2.pngDIAG2"/>
+          <p:cNvPicPr>
+            <a:picLocks noChangeAspect="1"/>
+          </p:cNvPicPr>
+          <p:nvPr>
+            <p:ph idx="1"/>
+          </p:nvPr>
+        </p:nvPicPr>
+        <p:blipFill>
+          <a:blip r:embed="rId1"/>
+          <a:srcRect l="3" r="3"/>
+          <a:stretch>
+            <a:fillRect/>
+          </a:stretch>
+        </p:blipFill>
+        <p:spPr>
+          <a:xfrm>
+            <a:off x="763270" y="1148715"/>
+            <a:ext cx="4161155" cy="3500120"/>
+          </a:xfrm>
+          <a:prstGeom prst="rect">
+            <a:avLst/>
+          </a:prstGeom>
+          <a:effectLst>
+            <a:outerShdw blurRad="114300" dist="38100" dir="2700000" algn="tl" rotWithShape="0">
+              <a:prstClr val="black">
+                <a:alpha val="40000"/>
+              </a:prstClr>
+            </a:outerShdw>
+          </a:effectLst>
+        </p:spPr>
+      </p:pic>
+      <p:pic>
+        <p:nvPicPr>
+          <p:cNvPr id="7" name="Picture 6"/>
+          <p:cNvPicPr>
+            <a:picLocks noChangeAspect="1"/>
+          </p:cNvPicPr>
+          <p:nvPr/>
+        </p:nvPicPr>
+        <p:blipFill>
+          <a:blip r:embed="rId2"/>
+          <a:stretch>
+            <a:fillRect/>
+          </a:stretch>
+        </p:blipFill>
+        <p:spPr>
+          <a:xfrm>
+            <a:off x="5453380" y="1703070"/>
+            <a:ext cx="2838450" cy="1581150"/>
+          </a:xfrm>
+          <a:prstGeom prst="rect">
+            <a:avLst/>
+          </a:prstGeom>
+          <a:effectLst>
+            <a:outerShdw blurRad="114300" dist="38100" dir="2700000" algn="tl" rotWithShape="0">
+              <a:prstClr val="black">
+                <a:alpha val="40000"/>
+              </a:prstClr>
+            </a:outerShdw>
+          </a:effectLst>
+        </p:spPr>
+      </p:pic>
+    </p:spTree>
+  </p:cSld>
+  <p:clrMapOvr>
+    <a:masterClrMapping/>
+  </p:clrMapOvr>
+</p:sld>
+</file>
+
+<file path=ppt/slides/slide2.xml><?xml version="1.0" encoding="utf-8"?>
+<p:sld xmlns:a="http://schemas.openxmlformats.org/drawingml/2006/main" xmlns:r="http://schemas.openxmlformats.org/officeDocument/2006/relationships" xmlns:p="http://schemas.openxmlformats.org/presentationml/2006/main">
+  <p:cSld>
+    <p:spTree>
+      <p:nvGrpSpPr>
+        <p:cNvPr id="1" name=""/>
+        <p:cNvGrpSpPr/>
+        <p:nvPr/>
+      </p:nvGrpSpPr>
+      <p:grpSpPr/>
+      <p:grpSp>
+        <p:nvGrpSpPr>
+          <p:cNvPr id="5122" name="组合 5"/>
+          <p:cNvGrpSpPr/>
+          <p:nvPr/>
+        </p:nvGrpSpPr>
+        <p:grpSpPr>
+          <a:xfrm>
+            <a:off x="0" y="0"/>
+            <a:ext cx="4575175" cy="5068888"/>
+            <a:chOff x="-3" y="-11007"/>
+            <a:chExt cx="2575977" cy="2853574"/>
+          </a:xfrm>
+        </p:grpSpPr>
+        <p:pic>
+          <p:nvPicPr>
+            <p:cNvPr id="5128" name="图片 3"/>
+            <p:cNvPicPr>
+              <a:picLocks noChangeAspect="1"/>
+            </p:cNvPicPr>
+            <p:nvPr/>
+          </p:nvPicPr>
+          <p:blipFill>
+            <a:blip r:embed="rId1"/>
+            <a:srcRect t="34021" r="41302" b="21577"/>
+            <a:stretch>
+              <a:fillRect/>
+            </a:stretch>
+          </p:blipFill>
+          <p:spPr>
+            <a:xfrm flipH="1">
+              <a:off x="-3" y="-11007"/>
+              <a:ext cx="2575977" cy="2853574"/>
+            </a:xfrm>
+            <a:prstGeom prst="rect">
+              <a:avLst/>
+            </a:prstGeom>
+            <a:noFill/>
+            <a:ln w="9525">
+              <a:noFill/>
+            </a:ln>
+          </p:spPr>
+        </p:pic>
+        <p:pic>
+          <p:nvPicPr>
+            <p:cNvPr id="5129" name="图片 4"/>
+            <p:cNvPicPr>
+              <a:picLocks noChangeAspect="1"/>
+            </p:cNvPicPr>
+            <p:nvPr/>
+          </p:nvPicPr>
+          <p:blipFill>
+            <a:blip r:embed="rId2"/>
+            <a:srcRect t="29494" r="41618" b="20621"/>
+            <a:stretch>
+              <a:fillRect/>
+            </a:stretch>
+          </p:blipFill>
+          <p:spPr>
+            <a:xfrm flipH="1">
+              <a:off x="-1" y="-11007"/>
+              <a:ext cx="1568449" cy="2022899"/>
+            </a:xfrm>
+            <a:prstGeom prst="rect">
+              <a:avLst/>
+            </a:prstGeom>
+            <a:noFill/>
+            <a:ln w="9525">
+              <a:noFill/>
+            </a:ln>
+          </p:spPr>
+        </p:pic>
+      </p:grpSp>
+      <p:sp>
+        <p:nvSpPr>
+          <p:cNvPr id="7" name="文本框 6"/>
+          <p:cNvSpPr txBox="1"/>
+          <p:nvPr/>
+        </p:nvSpPr>
+        <p:spPr>
+          <a:xfrm>
+            <a:off x="4575175" y="1698625"/>
+            <a:ext cx="3681413" cy="1586230"/>
+          </a:xfrm>
+          <a:prstGeom prst="rect">
+            <a:avLst/>
+          </a:prstGeom>
+          <a:noFill/>
+        </p:spPr>
+        <p:txBody>
+          <a:bodyPr wrap="square" rtlCol="0">
+            <a:spAutoFit/>
+          </a:bodyPr>
+          <a:lstStyle/>
+          <a:p>
+            <a:pPr marR="0" algn="ctr" defTabSz="685800" eaLnBrk="1" fontAlgn="auto" hangingPunct="1">
+              <a:lnSpc>
+                <a:spcPct val="120000"/>
+              </a:lnSpc>
+              <a:spcBef>
+                <a:spcPts val="0"/>
+              </a:spcBef>
+              <a:spcAft>
+                <a:spcPts val="0"/>
+              </a:spcAft>
+              <a:buClrTx/>
+              <a:buSzTx/>
+              <a:buFontTx/>
+              <a:defRPr/>
+            </a:pPr>
+            <a:r>
+              <a:rPr kumimoji="0" lang="en-US" altLang="zh-CN" sz="4050" kern="1200" cap="none" spc="0" normalizeH="0" baseline="0" noProof="0" dirty="0">
+                <a:solidFill>
+                  <a:srgbClr val="50D8C8"/>
+                </a:solidFill>
+                <a:latin typeface="Arial" panose="020B0604020202020204" pitchFamily="34" charset="0"/>
+                <a:ea typeface="Arial" panose="020B0604020202020204" pitchFamily="34" charset="0"/>
+                <a:cs typeface="Arial" panose="020B0604020202020204" pitchFamily="34" charset="0"/>
+              </a:rPr>
+              <a:t>Transportation Management</a:t>
+            </a:r>
+            <a:endParaRPr kumimoji="0" lang="en-US" altLang="zh-CN" sz="4050" kern="1200" cap="none" spc="0" normalizeH="0" baseline="0" noProof="0" dirty="0">
+              <a:solidFill>
+                <a:srgbClr val="50D8C8"/>
+              </a:solidFill>
+              <a:latin typeface="Arial" panose="020B0604020202020204" pitchFamily="34" charset="0"/>
+              <a:ea typeface="Arial" panose="020B0604020202020204" pitchFamily="34" charset="0"/>
+              <a:cs typeface="Arial" panose="020B0604020202020204" pitchFamily="34" charset="0"/>
+            </a:endParaRPr>
+          </a:p>
+        </p:txBody>
+      </p:sp>
+      <p:pic>
+        <p:nvPicPr>
+          <p:cNvPr id="5125" name="图片 11"/>
+          <p:cNvPicPr>
+            <a:picLocks noChangeAspect="1"/>
+          </p:cNvPicPr>
+          <p:nvPr/>
+        </p:nvPicPr>
+        <p:blipFill>
+          <a:blip r:embed="rId3"/>
+          <a:srcRect r="4973" b="7013"/>
+          <a:stretch>
+            <a:fillRect/>
+          </a:stretch>
+        </p:blipFill>
+        <p:spPr>
+          <a:xfrm>
+            <a:off x="6157913" y="3071813"/>
+            <a:ext cx="2986087" cy="2071687"/>
+          </a:xfrm>
+          <a:prstGeom prst="rect">
+            <a:avLst/>
+          </a:prstGeom>
+          <a:noFill/>
+          <a:ln w="9525">
+            <a:noFill/>
+          </a:ln>
+        </p:spPr>
+      </p:pic>
+    </p:spTree>
+  </p:cSld>
+  <p:clrMapOvr>
+    <a:masterClrMapping/>
+  </p:clrMapOvr>
+  <p:transition spd="slow"/>
+</p:sld>
+</file>
+
+<file path=ppt/slides/slide20.xml><?xml version="1.0" encoding="utf-8"?>
+<p:sld xmlns:a="http://schemas.openxmlformats.org/drawingml/2006/main" xmlns:r="http://schemas.openxmlformats.org/officeDocument/2006/relationships" xmlns:p="http://schemas.openxmlformats.org/presentationml/2006/main">
+  <p:cSld>
+    <p:spTree>
+      <p:nvGrpSpPr>
+        <p:cNvPr id="1" name=""/>
+        <p:cNvGrpSpPr/>
+        <p:nvPr/>
+      </p:nvGrpSpPr>
+      <p:grpSpPr/>
+      <p:sp>
+        <p:nvSpPr>
+          <p:cNvPr id="2" name="Title 1"/>
+          <p:cNvSpPr>
+            <a:spLocks noGrp="1"/>
+          </p:cNvSpPr>
+          <p:nvPr>
+            <p:ph type="title"/>
+          </p:nvPr>
+        </p:nvSpPr>
+        <p:spPr/>
+        <p:txBody>
+          <a:bodyPr/>
+          <a:p>
+            <a:r>
+              <a:rPr lang="en-GB" altLang="en-US">
+                <a:sym typeface="+mn-ea"/>
+              </a:rPr>
+              <a:t>Penjelasan Dijkstra's Algorithm</a:t>
+            </a:r>
+            <a:endParaRPr lang="en-US"/>
+          </a:p>
+        </p:txBody>
+      </p:sp>
+      <p:pic>
+        <p:nvPicPr>
+          <p:cNvPr id="6" name="Content Placeholder 5" descr="C:\Users\aftermath\Documents\CS-101\SAINS MANAJEMEN\ASSET\DIAG3.pngDIAG3"/>
+          <p:cNvPicPr>
+            <a:picLocks noChangeAspect="1"/>
+          </p:cNvPicPr>
+          <p:nvPr>
+            <p:ph idx="1"/>
+          </p:nvPr>
+        </p:nvPicPr>
+        <p:blipFill>
+          <a:blip r:embed="rId1"/>
+          <a:srcRect l="3" r="3"/>
+          <a:stretch>
+            <a:fillRect/>
+          </a:stretch>
+        </p:blipFill>
+        <p:spPr>
+          <a:xfrm>
+            <a:off x="763270" y="1148715"/>
+            <a:ext cx="4161155" cy="3500120"/>
+          </a:xfrm>
+          <a:prstGeom prst="rect">
+            <a:avLst/>
+          </a:prstGeom>
+          <a:effectLst>
+            <a:outerShdw blurRad="114300" dist="38100" dir="2700000" algn="tl" rotWithShape="0">
+              <a:prstClr val="black">
+                <a:alpha val="40000"/>
+              </a:prstClr>
+            </a:outerShdw>
+          </a:effectLst>
+        </p:spPr>
+      </p:pic>
+      <p:pic>
+        <p:nvPicPr>
+          <p:cNvPr id="7" name="Picture 6"/>
+          <p:cNvPicPr>
+            <a:picLocks noChangeAspect="1"/>
+          </p:cNvPicPr>
+          <p:nvPr/>
+        </p:nvPicPr>
+        <p:blipFill>
+          <a:blip r:embed="rId2"/>
+          <a:stretch>
+            <a:fillRect/>
+          </a:stretch>
+        </p:blipFill>
+        <p:spPr>
+          <a:xfrm>
+            <a:off x="5453380" y="1703070"/>
+            <a:ext cx="2838450" cy="1581150"/>
+          </a:xfrm>
+          <a:prstGeom prst="rect">
+            <a:avLst/>
+          </a:prstGeom>
+          <a:effectLst>
+            <a:outerShdw blurRad="114300" dist="38100" dir="2700000" algn="tl" rotWithShape="0">
+              <a:prstClr val="black">
+                <a:alpha val="40000"/>
+              </a:prstClr>
+            </a:outerShdw>
+          </a:effectLst>
+        </p:spPr>
+      </p:pic>
+    </p:spTree>
+  </p:cSld>
+  <p:clrMapOvr>
+    <a:masterClrMapping/>
+  </p:clrMapOvr>
+</p:sld>
+</file>
+
+<file path=ppt/slides/slide21.xml><?xml version="1.0" encoding="utf-8"?>
+<p:sld xmlns:a="http://schemas.openxmlformats.org/drawingml/2006/main" xmlns:r="http://schemas.openxmlformats.org/officeDocument/2006/relationships" xmlns:p="http://schemas.openxmlformats.org/presentationml/2006/main">
+  <p:cSld>
+    <p:spTree>
+      <p:nvGrpSpPr>
+        <p:cNvPr id="1" name=""/>
+        <p:cNvGrpSpPr/>
+        <p:nvPr/>
+      </p:nvGrpSpPr>
+      <p:grpSpPr/>
+      <p:sp>
+        <p:nvSpPr>
+          <p:cNvPr id="2" name="Title 1"/>
+          <p:cNvSpPr>
+            <a:spLocks noGrp="1"/>
+          </p:cNvSpPr>
+          <p:nvPr>
+            <p:ph type="title"/>
+          </p:nvPr>
+        </p:nvSpPr>
+        <p:spPr/>
+        <p:txBody>
+          <a:bodyPr/>
+          <a:p>
+            <a:r>
+              <a:rPr lang="en-GB" altLang="en-US">
+                <a:sym typeface="+mn-ea"/>
+              </a:rPr>
+              <a:t>Penjelasan Dijkstra's Algorithm</a:t>
+            </a:r>
+            <a:endParaRPr lang="en-US"/>
+          </a:p>
+        </p:txBody>
+      </p:sp>
+      <p:pic>
+        <p:nvPicPr>
+          <p:cNvPr id="6" name="Content Placeholder 5" descr="C:\Users\aftermath\Documents\CS-101\SAINS MANAJEMEN\ASSET\DIAG3.pngDIAG3"/>
+          <p:cNvPicPr>
+            <a:picLocks noChangeAspect="1"/>
+          </p:cNvPicPr>
+          <p:nvPr>
+            <p:ph idx="1"/>
+          </p:nvPr>
+        </p:nvPicPr>
+        <p:blipFill>
+          <a:blip r:embed="rId1"/>
+          <a:srcRect l="3" r="3"/>
+          <a:stretch>
+            <a:fillRect/>
+          </a:stretch>
+        </p:blipFill>
+        <p:spPr>
+          <a:xfrm>
+            <a:off x="763270" y="1148715"/>
+            <a:ext cx="4161155" cy="3500120"/>
+          </a:xfrm>
+          <a:prstGeom prst="rect">
+            <a:avLst/>
+          </a:prstGeom>
+          <a:effectLst>
+            <a:outerShdw blurRad="114300" dist="38100" dir="2700000" algn="tl" rotWithShape="0">
+              <a:prstClr val="black">
+                <a:alpha val="40000"/>
+              </a:prstClr>
+            </a:outerShdw>
+          </a:effectLst>
+        </p:spPr>
+      </p:pic>
+      <p:pic>
+        <p:nvPicPr>
+          <p:cNvPr id="7" name="Picture 6"/>
+          <p:cNvPicPr>
+            <a:picLocks noChangeAspect="1"/>
+          </p:cNvPicPr>
+          <p:nvPr/>
+        </p:nvPicPr>
+        <p:blipFill>
+          <a:blip r:embed="rId2"/>
+          <a:stretch>
+            <a:fillRect/>
+          </a:stretch>
+        </p:blipFill>
+        <p:spPr>
+          <a:xfrm>
+            <a:off x="5453380" y="1703070"/>
+            <a:ext cx="2838450" cy="1581150"/>
+          </a:xfrm>
+          <a:prstGeom prst="rect">
+            <a:avLst/>
+          </a:prstGeom>
+          <a:effectLst>
+            <a:outerShdw blurRad="114300" dist="38100" dir="2700000" algn="tl" rotWithShape="0">
+              <a:prstClr val="black">
+                <a:alpha val="40000"/>
+              </a:prstClr>
+            </a:outerShdw>
+          </a:effectLst>
+        </p:spPr>
+      </p:pic>
+      <p:sp>
+        <p:nvSpPr>
+          <p:cNvPr id="4" name="文本框 19"/>
+          <p:cNvSpPr txBox="1"/>
+          <p:nvPr/>
+        </p:nvSpPr>
+        <p:spPr>
+          <a:xfrm>
+            <a:off x="5453380" y="3401060"/>
+            <a:ext cx="2837815" cy="755650"/>
+          </a:xfrm>
+          <a:prstGeom prst="rect">
+            <a:avLst/>
+          </a:prstGeom>
+          <a:noFill/>
+        </p:spPr>
+        <p:txBody>
+          <a:bodyPr wrap="square" rtlCol="0">
+            <a:spAutoFit/>
+          </a:bodyPr>
+          <a:p>
+            <a:pPr marR="0" algn="l" defTabSz="685800" eaLnBrk="1" fontAlgn="auto" hangingPunct="1">
+              <a:lnSpc>
+                <a:spcPct val="120000"/>
+              </a:lnSpc>
+              <a:spcBef>
+                <a:spcPts val="0"/>
+              </a:spcBef>
+              <a:spcAft>
+                <a:spcPts val="0"/>
+              </a:spcAft>
+              <a:buClrTx/>
+              <a:buSzTx/>
+              <a:buFontTx/>
+              <a:defRPr/>
+            </a:pPr>
+            <a:r>
+              <a:rPr kumimoji="0" lang="en-GB" altLang="en-US" sz="1800" kern="1200" cap="none" spc="0" normalizeH="0" baseline="0" noProof="0" dirty="0">
+                <a:solidFill>
+                  <a:schemeClr val="bg1"/>
+                </a:solidFill>
+                <a:latin typeface="Arial" panose="020B0604020202020204" pitchFamily="34" charset="0"/>
+                <a:ea typeface="Arial" panose="020B0604020202020204" pitchFamily="34" charset="0"/>
+                <a:cs typeface="Arial" panose="020B0604020202020204" pitchFamily="34" charset="0"/>
+              </a:rPr>
+              <a:t>Case 1 : </a:t>
+            </a:r>
+            <a:endParaRPr kumimoji="0" lang="en-GB" altLang="en-US" sz="1800" kern="1200" cap="none" spc="0" normalizeH="0" baseline="0" noProof="0" dirty="0">
+              <a:solidFill>
+                <a:schemeClr val="bg1"/>
+              </a:solidFill>
+              <a:latin typeface="Arial" panose="020B0604020202020204" pitchFamily="34" charset="0"/>
+              <a:ea typeface="Arial" panose="020B0604020202020204" pitchFamily="34" charset="0"/>
+              <a:cs typeface="Arial" panose="020B0604020202020204" pitchFamily="34" charset="0"/>
+            </a:endParaRPr>
+          </a:p>
+          <a:p>
+            <a:pPr marR="0" algn="l" defTabSz="685800" eaLnBrk="1" fontAlgn="auto" hangingPunct="1">
+              <a:lnSpc>
+                <a:spcPct val="120000"/>
+              </a:lnSpc>
+              <a:spcBef>
+                <a:spcPts val="0"/>
+              </a:spcBef>
+              <a:spcAft>
+                <a:spcPts val="0"/>
+              </a:spcAft>
+              <a:buClrTx/>
+              <a:buSzTx/>
+              <a:buFontTx/>
+              <a:defRPr/>
+            </a:pPr>
+            <a:r>
+              <a:rPr kumimoji="0" lang="en-GB" altLang="en-US" sz="1800" kern="1200" cap="none" spc="0" normalizeH="0" baseline="0" noProof="0" dirty="0">
+                <a:solidFill>
+                  <a:schemeClr val="bg1"/>
+                </a:solidFill>
+                <a:latin typeface="Arial" panose="020B0604020202020204" pitchFamily="34" charset="0"/>
+                <a:ea typeface="Arial" panose="020B0604020202020204" pitchFamily="34" charset="0"/>
+                <a:cs typeface="Arial" panose="020B0604020202020204" pitchFamily="34" charset="0"/>
+              </a:rPr>
+              <a:t>menggunakan 1 provider</a:t>
+            </a:r>
+            <a:endParaRPr kumimoji="0" lang="en-GB" altLang="en-US" sz="1800" kern="1200" cap="none" spc="0" normalizeH="0" baseline="0" noProof="0" dirty="0">
+              <a:solidFill>
+                <a:schemeClr val="bg1"/>
+              </a:solidFill>
+              <a:latin typeface="Arial" panose="020B0604020202020204" pitchFamily="34" charset="0"/>
+              <a:ea typeface="Arial" panose="020B0604020202020204" pitchFamily="34" charset="0"/>
+              <a:cs typeface="Arial" panose="020B0604020202020204" pitchFamily="34" charset="0"/>
+            </a:endParaRPr>
+          </a:p>
+        </p:txBody>
+      </p:sp>
+    </p:spTree>
+  </p:cSld>
+  <p:clrMapOvr>
+    <a:masterClrMapping/>
+  </p:clrMapOvr>
+</p:sld>
+</file>
+
+<file path=ppt/slides/slide22.xml><?xml version="1.0" encoding="utf-8"?>
+<p:sld xmlns:a="http://schemas.openxmlformats.org/drawingml/2006/main" xmlns:r="http://schemas.openxmlformats.org/officeDocument/2006/relationships" xmlns:p="http://schemas.openxmlformats.org/presentationml/2006/main">
+  <p:cSld>
+    <p:spTree>
+      <p:nvGrpSpPr>
+        <p:cNvPr id="1" name=""/>
+        <p:cNvGrpSpPr/>
+        <p:nvPr/>
+      </p:nvGrpSpPr>
+      <p:grpSpPr/>
+      <p:sp>
+        <p:nvSpPr>
+          <p:cNvPr id="2" name="Title 1"/>
+          <p:cNvSpPr>
+            <a:spLocks noGrp="1"/>
+          </p:cNvSpPr>
+          <p:nvPr>
+            <p:ph type="title"/>
+          </p:nvPr>
+        </p:nvSpPr>
+        <p:spPr/>
+        <p:txBody>
+          <a:bodyPr/>
+          <a:p>
+            <a:r>
+              <a:rPr lang="en-GB" altLang="en-US">
+                <a:sym typeface="+mn-ea"/>
+              </a:rPr>
+              <a:t>Penjelasan Dijkstra's Algorithm</a:t>
+            </a:r>
+            <a:endParaRPr lang="en-US"/>
+          </a:p>
+        </p:txBody>
+      </p:sp>
+      <p:pic>
+        <p:nvPicPr>
+          <p:cNvPr id="6" name="Content Placeholder 5" descr="C:\Users\aftermath\Documents\CS-101\SAINS MANAJEMEN\ASSET\DIAG3.pngDIAG3"/>
+          <p:cNvPicPr>
+            <a:picLocks noChangeAspect="1"/>
+          </p:cNvPicPr>
+          <p:nvPr>
+            <p:ph idx="1"/>
+          </p:nvPr>
+        </p:nvPicPr>
+        <p:blipFill>
+          <a:blip r:embed="rId1"/>
+          <a:srcRect l="3" r="3"/>
+          <a:stretch>
+            <a:fillRect/>
+          </a:stretch>
+        </p:blipFill>
+        <p:spPr>
+          <a:xfrm>
+            <a:off x="763270" y="1148715"/>
+            <a:ext cx="4161155" cy="3500120"/>
+          </a:xfrm>
+          <a:prstGeom prst="rect">
+            <a:avLst/>
+          </a:prstGeom>
+          <a:effectLst>
+            <a:outerShdw blurRad="114300" dist="38100" dir="2700000" algn="tl" rotWithShape="0">
+              <a:prstClr val="black">
+                <a:alpha val="40000"/>
+              </a:prstClr>
+            </a:outerShdw>
+          </a:effectLst>
+        </p:spPr>
+      </p:pic>
+      <p:pic>
+        <p:nvPicPr>
+          <p:cNvPr id="7" name="Picture 6"/>
+          <p:cNvPicPr>
+            <a:picLocks noChangeAspect="1"/>
+          </p:cNvPicPr>
+          <p:nvPr/>
+        </p:nvPicPr>
+        <p:blipFill>
+          <a:blip r:embed="rId2"/>
+          <a:stretch>
+            <a:fillRect/>
+          </a:stretch>
+        </p:blipFill>
+        <p:spPr>
+          <a:xfrm>
+            <a:off x="5453380" y="1703070"/>
+            <a:ext cx="2838450" cy="1581150"/>
+          </a:xfrm>
+          <a:prstGeom prst="rect">
+            <a:avLst/>
+          </a:prstGeom>
+          <a:effectLst>
+            <a:outerShdw blurRad="114300" dist="38100" dir="2700000" algn="tl" rotWithShape="0">
+              <a:prstClr val="black">
+                <a:alpha val="40000"/>
+              </a:prstClr>
+            </a:outerShdw>
+          </a:effectLst>
+        </p:spPr>
+      </p:pic>
+      <p:sp>
+        <p:nvSpPr>
+          <p:cNvPr id="4" name="文本框 19"/>
+          <p:cNvSpPr txBox="1"/>
+          <p:nvPr/>
+        </p:nvSpPr>
+        <p:spPr>
+          <a:xfrm>
+            <a:off x="5453380" y="3401060"/>
+            <a:ext cx="2837815" cy="1087755"/>
+          </a:xfrm>
+          <a:prstGeom prst="rect">
+            <a:avLst/>
+          </a:prstGeom>
+          <a:noFill/>
+        </p:spPr>
+        <p:txBody>
+          <a:bodyPr wrap="square" rtlCol="0">
+            <a:spAutoFit/>
+          </a:bodyPr>
+          <a:p>
+            <a:pPr marR="0" algn="l" defTabSz="685800" eaLnBrk="1" fontAlgn="auto" hangingPunct="1">
+              <a:lnSpc>
+                <a:spcPct val="120000"/>
+              </a:lnSpc>
+              <a:spcBef>
+                <a:spcPts val="0"/>
+              </a:spcBef>
+              <a:spcAft>
+                <a:spcPts val="0"/>
+              </a:spcAft>
+              <a:buClrTx/>
+              <a:buSzTx/>
+              <a:buFontTx/>
+              <a:defRPr/>
+            </a:pPr>
+            <a:r>
+              <a:rPr kumimoji="0" lang="en-GB" altLang="en-US" sz="1800" kern="1200" cap="none" spc="0" normalizeH="0" baseline="0" noProof="0" dirty="0">
+                <a:solidFill>
+                  <a:schemeClr val="bg1"/>
+                </a:solidFill>
+                <a:latin typeface="Arial" panose="020B0604020202020204" pitchFamily="34" charset="0"/>
+                <a:ea typeface="Arial" panose="020B0604020202020204" pitchFamily="34" charset="0"/>
+                <a:cs typeface="Arial" panose="020B0604020202020204" pitchFamily="34" charset="0"/>
+              </a:rPr>
+              <a:t>Case 2 : </a:t>
+            </a:r>
+            <a:endParaRPr kumimoji="0" lang="en-GB" altLang="en-US" sz="1800" kern="1200" cap="none" spc="0" normalizeH="0" baseline="0" noProof="0" dirty="0">
+              <a:solidFill>
+                <a:schemeClr val="bg1"/>
+              </a:solidFill>
+              <a:latin typeface="Arial" panose="020B0604020202020204" pitchFamily="34" charset="0"/>
+              <a:ea typeface="Arial" panose="020B0604020202020204" pitchFamily="34" charset="0"/>
+              <a:cs typeface="Arial" panose="020B0604020202020204" pitchFamily="34" charset="0"/>
+            </a:endParaRPr>
+          </a:p>
+          <a:p>
+            <a:pPr marR="0" algn="l" defTabSz="685800" eaLnBrk="1" fontAlgn="auto" hangingPunct="1">
+              <a:lnSpc>
+                <a:spcPct val="120000"/>
+              </a:lnSpc>
+              <a:spcBef>
+                <a:spcPts val="0"/>
+              </a:spcBef>
+              <a:spcAft>
+                <a:spcPts val="0"/>
+              </a:spcAft>
+              <a:buClrTx/>
+              <a:buSzTx/>
+              <a:buFontTx/>
+              <a:defRPr/>
+            </a:pPr>
+            <a:r>
+              <a:rPr kumimoji="0" lang="en-GB" altLang="en-US" sz="1800" kern="1200" cap="none" spc="0" normalizeH="0" baseline="0" noProof="0" dirty="0">
+                <a:solidFill>
+                  <a:schemeClr val="bg1"/>
+                </a:solidFill>
+                <a:latin typeface="Arial" panose="020B0604020202020204" pitchFamily="34" charset="0"/>
+                <a:ea typeface="Arial" panose="020B0604020202020204" pitchFamily="34" charset="0"/>
+                <a:cs typeface="Arial" panose="020B0604020202020204" pitchFamily="34" charset="0"/>
+              </a:rPr>
+              <a:t>menggunakan lebih dari 1 provider</a:t>
+            </a:r>
+            <a:endParaRPr kumimoji="0" lang="en-GB" altLang="en-US" sz="1800" kern="1200" cap="none" spc="0" normalizeH="0" baseline="0" noProof="0" dirty="0">
+              <a:solidFill>
+                <a:schemeClr val="bg1"/>
+              </a:solidFill>
+              <a:latin typeface="Arial" panose="020B0604020202020204" pitchFamily="34" charset="0"/>
+              <a:ea typeface="Arial" panose="020B0604020202020204" pitchFamily="34" charset="0"/>
+              <a:cs typeface="Arial" panose="020B0604020202020204" pitchFamily="34" charset="0"/>
+            </a:endParaRPr>
+          </a:p>
+        </p:txBody>
+      </p:sp>
+    </p:spTree>
+  </p:cSld>
+  <p:clrMapOvr>
+    <a:masterClrMapping/>
+  </p:clrMapOvr>
+</p:sld>
+</file>
+
+<file path=ppt/slides/slide23.xml><?xml version="1.0" encoding="utf-8"?>
+<p:sld xmlns:a="http://schemas.openxmlformats.org/drawingml/2006/main" xmlns:r="http://schemas.openxmlformats.org/officeDocument/2006/relationships" xmlns:p="http://schemas.openxmlformats.org/presentationml/2006/main">
+  <p:cSld>
+    <p:spTree>
+      <p:nvGrpSpPr>
+        <p:cNvPr id="1" name=""/>
+        <p:cNvGrpSpPr/>
+        <p:nvPr/>
+      </p:nvGrpSpPr>
+      <p:grpSpPr/>
       <p:grpSp>
         <p:nvGrpSpPr>
           <p:cNvPr id="32770" name="组合 1"/>
@@ -5499,186 +6710,6 @@
           </a:p>
         </p:txBody>
       </p:sp>
-    </p:spTree>
-  </p:cSld>
-  <p:clrMapOvr>
-    <a:masterClrMapping/>
-  </p:clrMapOvr>
-  <p:transition spd="slow"/>
-</p:sld>
-</file>
-
-<file path=ppt/slides/slide2.xml><?xml version="1.0" encoding="utf-8"?>
-<p:sld xmlns:a="http://schemas.openxmlformats.org/drawingml/2006/main" xmlns:r="http://schemas.openxmlformats.org/officeDocument/2006/relationships" xmlns:p="http://schemas.openxmlformats.org/presentationml/2006/main">
-  <p:cSld>
-    <p:spTree>
-      <p:nvGrpSpPr>
-        <p:cNvPr id="1" name=""/>
-        <p:cNvGrpSpPr/>
-        <p:nvPr/>
-      </p:nvGrpSpPr>
-      <p:grpSpPr/>
-      <p:grpSp>
-        <p:nvGrpSpPr>
-          <p:cNvPr id="5122" name="组合 5"/>
-          <p:cNvGrpSpPr/>
-          <p:nvPr/>
-        </p:nvGrpSpPr>
-        <p:grpSpPr>
-          <a:xfrm>
-            <a:off x="0" y="0"/>
-            <a:ext cx="4575175" cy="5068888"/>
-            <a:chOff x="-3" y="-11007"/>
-            <a:chExt cx="2575977" cy="2853574"/>
-          </a:xfrm>
-        </p:grpSpPr>
-        <p:pic>
-          <p:nvPicPr>
-            <p:cNvPr id="5128" name="图片 3"/>
-            <p:cNvPicPr>
-              <a:picLocks noChangeAspect="1"/>
-            </p:cNvPicPr>
-            <p:nvPr/>
-          </p:nvPicPr>
-          <p:blipFill>
-            <a:blip r:embed="rId1"/>
-            <a:srcRect t="34021" r="41302" b="21577"/>
-            <a:stretch>
-              <a:fillRect/>
-            </a:stretch>
-          </p:blipFill>
-          <p:spPr>
-            <a:xfrm flipH="1">
-              <a:off x="-3" y="-11007"/>
-              <a:ext cx="2575977" cy="2853574"/>
-            </a:xfrm>
-            <a:prstGeom prst="rect">
-              <a:avLst/>
-            </a:prstGeom>
-            <a:noFill/>
-            <a:ln w="9525">
-              <a:noFill/>
-            </a:ln>
-          </p:spPr>
-        </p:pic>
-        <p:pic>
-          <p:nvPicPr>
-            <p:cNvPr id="5129" name="图片 4"/>
-            <p:cNvPicPr>
-              <a:picLocks noChangeAspect="1"/>
-            </p:cNvPicPr>
-            <p:nvPr/>
-          </p:nvPicPr>
-          <p:blipFill>
-            <a:blip r:embed="rId2"/>
-            <a:srcRect t="29494" r="41618" b="20621"/>
-            <a:stretch>
-              <a:fillRect/>
-            </a:stretch>
-          </p:blipFill>
-          <p:spPr>
-            <a:xfrm flipH="1">
-              <a:off x="-1" y="-11007"/>
-              <a:ext cx="1568449" cy="2022899"/>
-            </a:xfrm>
-            <a:prstGeom prst="rect">
-              <a:avLst/>
-            </a:prstGeom>
-            <a:noFill/>
-            <a:ln w="9525">
-              <a:noFill/>
-            </a:ln>
-          </p:spPr>
-        </p:pic>
-      </p:grpSp>
-      <p:sp>
-        <p:nvSpPr>
-          <p:cNvPr id="7" name="文本框 6"/>
-          <p:cNvSpPr txBox="1"/>
-          <p:nvPr/>
-        </p:nvSpPr>
-        <p:spPr>
-          <a:xfrm>
-            <a:off x="4575175" y="1698625"/>
-            <a:ext cx="3681413" cy="1586230"/>
-          </a:xfrm>
-          <a:prstGeom prst="rect">
-            <a:avLst/>
-          </a:prstGeom>
-          <a:noFill/>
-        </p:spPr>
-        <p:txBody>
-          <a:bodyPr wrap="square" rtlCol="0">
-            <a:spAutoFit/>
-          </a:bodyPr>
-          <a:lstStyle/>
-          <a:p>
-            <a:pPr marR="0" algn="ctr" defTabSz="685800" eaLnBrk="1" fontAlgn="auto" hangingPunct="1">
-              <a:lnSpc>
-                <a:spcPct val="120000"/>
-              </a:lnSpc>
-              <a:spcBef>
-                <a:spcPts val="0"/>
-              </a:spcBef>
-              <a:spcAft>
-                <a:spcPts val="0"/>
-              </a:spcAft>
-              <a:buClrTx/>
-              <a:buSzTx/>
-              <a:buFontTx/>
-              <a:defRPr/>
-            </a:pPr>
-            <a:r>
-              <a:rPr kumimoji="0" lang="en-US" altLang="zh-CN" sz="4050" kern="1200" cap="none" spc="0" normalizeH="0" baseline="0" noProof="0" dirty="0">
-                <a:solidFill>
-                  <a:srgbClr val="50D8C8"/>
-                </a:solidFill>
-                <a:latin typeface="Arial" panose="020B0604020202020204" pitchFamily="34" charset="0"/>
-                <a:ea typeface="Arial" panose="020B0604020202020204" pitchFamily="34" charset="0"/>
-                <a:cs typeface="Arial" panose="020B0604020202020204" pitchFamily="34" charset="0"/>
-              </a:rPr>
-              <a:t>Transportation Management</a:t>
-            </a:r>
-            <a:endParaRPr kumimoji="0" lang="en-US" altLang="zh-CN" sz="4050" kern="1200" cap="none" spc="0" normalizeH="0" baseline="0" noProof="0" dirty="0">
-              <a:solidFill>
-                <a:srgbClr val="50D8C8"/>
-              </a:solidFill>
-              <a:latin typeface="Arial" panose="020B0604020202020204" pitchFamily="34" charset="0"/>
-              <a:ea typeface="Arial" panose="020B0604020202020204" pitchFamily="34" charset="0"/>
-              <a:cs typeface="Arial" panose="020B0604020202020204" pitchFamily="34" charset="0"/>
-            </a:endParaRPr>
-          </a:p>
-        </p:txBody>
-      </p:sp>
-      <p:pic>
-        <p:nvPicPr>
-          <p:cNvPr id="5125" name="图片 11"/>
-          <p:cNvPicPr>
-            <a:picLocks noChangeAspect="1"/>
-          </p:cNvPicPr>
-          <p:nvPr/>
-        </p:nvPicPr>
-        <p:blipFill>
-          <a:blip r:embed="rId3"/>
-          <a:srcRect r="4973" b="7013"/>
-          <a:stretch>
-            <a:fillRect/>
-          </a:stretch>
-        </p:blipFill>
-        <p:spPr>
-          <a:xfrm>
-            <a:off x="6157913" y="3071813"/>
-            <a:ext cx="2986087" cy="2071687"/>
-          </a:xfrm>
-          <a:prstGeom prst="rect">
-            <a:avLst/>
-          </a:prstGeom>
-          <a:noFill/>
-          <a:ln w="9525">
-            <a:noFill/>
-          </a:ln>
-        </p:spPr>
-      </p:pic>
     </p:spTree>
   </p:cSld>
   <p:clrMapOvr>
@@ -10495,7 +11526,7 @@
         <p:spPr>
           <a:xfrm>
             <a:off x="6855460" y="2471738"/>
-            <a:ext cx="2006600" cy="368300"/>
+            <a:ext cx="1572895" cy="368300"/>
           </a:xfrm>
           <a:prstGeom prst="rect">
             <a:avLst/>
@@ -10526,7 +11557,7 @@
                 <a:ea typeface="Arial" panose="020B0604020202020204" pitchFamily="34" charset="0"/>
                 <a:cs typeface="Arial" panose="020B0604020202020204" pitchFamily="34" charset="0"/>
               </a:rPr>
-              <a:t> cost * qty * weight</a:t>
+              <a:t> cost * weight</a:t>
             </a:r>
             <a:endParaRPr lang="en-US" sz="1500" dirty="0">
               <a:solidFill>

</xml_diff>